<commit_message>
Presentation file submission on Big Mountain Resort on April-1
</commit_message>
<xml_diff>
--- a/Presentation_on_Big_Mountain_Resort.pptx
+++ b/Presentation_on_Big_Mountain_Resort.pptx
@@ -111,6 +111,11 @@
       </a:defRPr>
     </a:lvl9pPr>
   </p:defaultTextStyle>
+  <p:extLst>
+    <p:ext uri="{EFAFB233-063F-42B5-8137-9DF3F51BA10A}">
+      <p15:sldGuideLst xmlns:p15="http://schemas.microsoft.com/office/powerpoint/2012/main"/>
+    </p:ext>
+  </p:extLst>
 </p:presentation>
 </file>
 
@@ -261,7 +266,7 @@
           <a:p>
             <a:fld id="{640ED9F5-2028-41C9-BC56-AD7CDC69C350}" type="datetimeFigureOut">
               <a:rPr lang="en-US" smtClean="0"/>
-              <a:t>3/19/2021</a:t>
+              <a:t>3/31/2021</a:t>
             </a:fld>
             <a:endParaRPr lang="en-US"/>
           </a:p>
@@ -459,7 +464,7 @@
           <a:p>
             <a:fld id="{640ED9F5-2028-41C9-BC56-AD7CDC69C350}" type="datetimeFigureOut">
               <a:rPr lang="en-US" smtClean="0"/>
-              <a:t>3/19/2021</a:t>
+              <a:t>3/31/2021</a:t>
             </a:fld>
             <a:endParaRPr lang="en-US"/>
           </a:p>
@@ -667,7 +672,7 @@
           <a:p>
             <a:fld id="{640ED9F5-2028-41C9-BC56-AD7CDC69C350}" type="datetimeFigureOut">
               <a:rPr lang="en-US" smtClean="0"/>
-              <a:t>3/19/2021</a:t>
+              <a:t>3/31/2021</a:t>
             </a:fld>
             <a:endParaRPr lang="en-US"/>
           </a:p>
@@ -865,7 +870,7 @@
           <a:p>
             <a:fld id="{640ED9F5-2028-41C9-BC56-AD7CDC69C350}" type="datetimeFigureOut">
               <a:rPr lang="en-US" smtClean="0"/>
-              <a:t>3/19/2021</a:t>
+              <a:t>3/31/2021</a:t>
             </a:fld>
             <a:endParaRPr lang="en-US"/>
           </a:p>
@@ -1140,7 +1145,7 @@
           <a:p>
             <a:fld id="{640ED9F5-2028-41C9-BC56-AD7CDC69C350}" type="datetimeFigureOut">
               <a:rPr lang="en-US" smtClean="0"/>
-              <a:t>3/19/2021</a:t>
+              <a:t>3/31/2021</a:t>
             </a:fld>
             <a:endParaRPr lang="en-US"/>
           </a:p>
@@ -1405,7 +1410,7 @@
           <a:p>
             <a:fld id="{640ED9F5-2028-41C9-BC56-AD7CDC69C350}" type="datetimeFigureOut">
               <a:rPr lang="en-US" smtClean="0"/>
-              <a:t>3/19/2021</a:t>
+              <a:t>3/31/2021</a:t>
             </a:fld>
             <a:endParaRPr lang="en-US"/>
           </a:p>
@@ -1817,7 +1822,7 @@
           <a:p>
             <a:fld id="{640ED9F5-2028-41C9-BC56-AD7CDC69C350}" type="datetimeFigureOut">
               <a:rPr lang="en-US" smtClean="0"/>
-              <a:t>3/19/2021</a:t>
+              <a:t>3/31/2021</a:t>
             </a:fld>
             <a:endParaRPr lang="en-US"/>
           </a:p>
@@ -1958,7 +1963,7 @@
           <a:p>
             <a:fld id="{640ED9F5-2028-41C9-BC56-AD7CDC69C350}" type="datetimeFigureOut">
               <a:rPr lang="en-US" smtClean="0"/>
-              <a:t>3/19/2021</a:t>
+              <a:t>3/31/2021</a:t>
             </a:fld>
             <a:endParaRPr lang="en-US"/>
           </a:p>
@@ -2071,7 +2076,7 @@
           <a:p>
             <a:fld id="{640ED9F5-2028-41C9-BC56-AD7CDC69C350}" type="datetimeFigureOut">
               <a:rPr lang="en-US" smtClean="0"/>
-              <a:t>3/19/2021</a:t>
+              <a:t>3/31/2021</a:t>
             </a:fld>
             <a:endParaRPr lang="en-US"/>
           </a:p>
@@ -2382,7 +2387,7 @@
           <a:p>
             <a:fld id="{640ED9F5-2028-41C9-BC56-AD7CDC69C350}" type="datetimeFigureOut">
               <a:rPr lang="en-US" smtClean="0"/>
-              <a:t>3/19/2021</a:t>
+              <a:t>3/31/2021</a:t>
             </a:fld>
             <a:endParaRPr lang="en-US"/>
           </a:p>
@@ -2670,7 +2675,7 @@
           <a:p>
             <a:fld id="{640ED9F5-2028-41C9-BC56-AD7CDC69C350}" type="datetimeFigureOut">
               <a:rPr lang="en-US" smtClean="0"/>
-              <a:t>3/19/2021</a:t>
+              <a:t>3/31/2021</a:t>
             </a:fld>
             <a:endParaRPr lang="en-US"/>
           </a:p>
@@ -2911,7 +2916,7 @@
           <a:p>
             <a:fld id="{640ED9F5-2028-41C9-BC56-AD7CDC69C350}" type="datetimeFigureOut">
               <a:rPr lang="en-US" smtClean="0"/>
-              <a:t>3/19/2021</a:t>
+              <a:t>3/31/2021</a:t>
             </a:fld>
             <a:endParaRPr lang="en-US"/>
           </a:p>
@@ -3558,7 +3563,7 @@
         <p:spPr>
           <a:xfrm>
             <a:off x="765424" y="767956"/>
-            <a:ext cx="10176553" cy="1569660"/>
+            <a:ext cx="10176553" cy="1938992"/>
           </a:xfrm>
           <a:prstGeom prst="rect">
             <a:avLst/>
@@ -3593,7 +3598,7 @@
                 <a:latin typeface="Arial" panose="020B0604020202020204" pitchFamily="34" charset="0"/>
                 <a:cs typeface="Arial" panose="020B0604020202020204" pitchFamily="34" charset="0"/>
               </a:rPr>
-              <a:t>$94.51</a:t>
+              <a:t>$94.22</a:t>
             </a:r>
             <a:r>
               <a:rPr lang="en-US" sz="2400" b="1" dirty="0">
@@ -3629,7 +3634,7 @@
                 <a:latin typeface="Arial" panose="020B0604020202020204" pitchFamily="34" charset="0"/>
                 <a:cs typeface="Arial" panose="020B0604020202020204" pitchFamily="34" charset="0"/>
               </a:rPr>
-              <a:t>$10.24</a:t>
+              <a:t>$10.39</a:t>
             </a:r>
             <a:r>
               <a:rPr lang="en-US" sz="2400" b="1" dirty="0">
@@ -3701,7 +3706,7 @@
                 <a:latin typeface="Arial" panose="020B0604020202020204" pitchFamily="34" charset="0"/>
                 <a:cs typeface="Arial" panose="020B0604020202020204" pitchFamily="34" charset="0"/>
               </a:rPr>
-              <a:t>4 runs </a:t>
+              <a:t>5 runs </a:t>
             </a:r>
             <a:r>
               <a:rPr lang="en-US" sz="2400" b="1" dirty="0">
@@ -3711,7 +3716,7 @@
                 <a:latin typeface="Arial" panose="020B0604020202020204" pitchFamily="34" charset="0"/>
                 <a:cs typeface="Arial" panose="020B0604020202020204" pitchFamily="34" charset="0"/>
               </a:rPr>
-              <a:t>can be closed.</a:t>
+              <a:t>can be closed as it has very less effect on the ticket price and revenue of the resort.</a:t>
             </a:r>
           </a:p>
         </p:txBody>
@@ -3844,7 +3849,7 @@
                 <a:latin typeface="Arial" panose="020B0604020202020204" pitchFamily="34" charset="0"/>
                 <a:cs typeface="Arial" panose="020B0604020202020204" pitchFamily="34" charset="0"/>
               </a:rPr>
-              <a:t>$18.0</a:t>
+              <a:t>$8.46</a:t>
             </a:r>
             <a:r>
               <a:rPr lang="en-US" sz="2400" b="1" dirty="0">
@@ -3864,17 +3869,7 @@
                 <a:latin typeface="Arial" panose="020B0604020202020204" pitchFamily="34" charset="0"/>
                 <a:cs typeface="Arial" panose="020B0604020202020204" pitchFamily="34" charset="0"/>
               </a:rPr>
-              <a:t>$31653005</a:t>
-            </a:r>
-            <a:r>
-              <a:rPr lang="en-US" sz="2400" b="1" dirty="0">
-                <a:solidFill>
-                  <a:srgbClr val="1B2AED"/>
-                </a:solidFill>
-                <a:latin typeface="Arial" panose="020B0604020202020204" pitchFamily="34" charset="0"/>
-                <a:cs typeface="Arial" panose="020B0604020202020204" pitchFamily="34" charset="0"/>
-              </a:rPr>
-              <a:t>.</a:t>
+              <a:t>$14811594.</a:t>
             </a:r>
           </a:p>
           <a:p>
@@ -3900,7 +3895,7 @@
                 <a:latin typeface="Arial" panose="020B0604020202020204" pitchFamily="34" charset="0"/>
                 <a:cs typeface="Arial" panose="020B0604020202020204" pitchFamily="34" charset="0"/>
               </a:rPr>
-              <a:t>4 runs </a:t>
+              <a:t>5 runs </a:t>
             </a:r>
             <a:r>
               <a:rPr lang="en-US" sz="2400" b="1" dirty="0">
@@ -3910,7 +3905,7 @@
                 <a:latin typeface="Arial" panose="020B0604020202020204" pitchFamily="34" charset="0"/>
                 <a:cs typeface="Arial" panose="020B0604020202020204" pitchFamily="34" charset="0"/>
               </a:rPr>
-              <a:t>will not have any effect on the ticket price.</a:t>
+              <a:t>will not have any significant effect on the ticket price.</a:t>
             </a:r>
           </a:p>
         </p:txBody>
@@ -4697,7 +4692,31 @@
                 <a:latin typeface="Arial" panose="020B0604020202020204" pitchFamily="34" charset="0"/>
                 <a:cs typeface="Arial" panose="020B0604020202020204" pitchFamily="34" charset="0"/>
               </a:rPr>
-              <a:t>Next, using Cross validation on the above Linear Regression model, model gave the best performance score with with 7 features. </a:t>
+              <a:t>Next, using Cross validation on the above Linear Regression model, model gave the best performance score with </a:t>
+            </a:r>
+            <a:r>
+              <a:rPr lang="en-US" sz="2400" b="1" dirty="0" err="1">
+                <a:solidFill>
+                  <a:schemeClr val="accent6">
+                    <a:lumMod val="50000"/>
+                  </a:schemeClr>
+                </a:solidFill>
+                <a:latin typeface="Arial" panose="020B0604020202020204" pitchFamily="34" charset="0"/>
+                <a:cs typeface="Arial" panose="020B0604020202020204" pitchFamily="34" charset="0"/>
+              </a:rPr>
+              <a:t>with</a:t>
+            </a:r>
+            <a:r>
+              <a:rPr lang="en-US" sz="2400" b="1" dirty="0">
+                <a:solidFill>
+                  <a:schemeClr val="accent6">
+                    <a:lumMod val="50000"/>
+                  </a:schemeClr>
+                </a:solidFill>
+                <a:latin typeface="Arial" panose="020B0604020202020204" pitchFamily="34" charset="0"/>
+                <a:cs typeface="Arial" panose="020B0604020202020204" pitchFamily="34" charset="0"/>
+              </a:rPr>
+              <a:t> 8 features. </a:t>
             </a:r>
           </a:p>
           <a:p>
@@ -4832,7 +4851,7 @@
                 <a:latin typeface="Arial" panose="020B0604020202020204" pitchFamily="34" charset="0"/>
                 <a:cs typeface="Arial" panose="020B0604020202020204" pitchFamily="34" charset="0"/>
               </a:rPr>
-              <a:t>9.316</a:t>
+              <a:t>9.495</a:t>
             </a:r>
           </a:p>
           <a:p>
@@ -4878,7 +4897,7 @@
                 <a:latin typeface="Arial" panose="020B0604020202020204" pitchFamily="34" charset="0"/>
                 <a:cs typeface="Arial" panose="020B0604020202020204" pitchFamily="34" charset="0"/>
               </a:rPr>
-              <a:t>10.035</a:t>
+              <a:t>9.659</a:t>
             </a:r>
             <a:endParaRPr lang="en-US" sz="2400" b="1" dirty="0">
               <a:solidFill>
@@ -4911,7 +4930,7 @@
                 <a:latin typeface="Arial" panose="020B0604020202020204" pitchFamily="34" charset="0"/>
                 <a:cs typeface="Arial" panose="020B0604020202020204" pitchFamily="34" charset="0"/>
               </a:rPr>
-              <a:t>0.913</a:t>
+              <a:t>1.349</a:t>
             </a:r>
             <a:endParaRPr lang="en-US" sz="2400" b="1" dirty="0">
               <a:solidFill>
@@ -4988,7 +5007,7 @@
                 <a:latin typeface="Arial" panose="020B0604020202020204" pitchFamily="34" charset="0"/>
                 <a:cs typeface="Arial" panose="020B0604020202020204" pitchFamily="34" charset="0"/>
               </a:rPr>
-              <a:t>9.999</a:t>
+              <a:t>11.793</a:t>
             </a:r>
           </a:p>
           <a:p>
@@ -5024,7 +5043,7 @@
                 <a:latin typeface="Arial" panose="020B0604020202020204" pitchFamily="34" charset="0"/>
                 <a:cs typeface="Arial" panose="020B0604020202020204" pitchFamily="34" charset="0"/>
               </a:rPr>
-              <a:t>0.579</a:t>
+              <a:t>0.499</a:t>
             </a:r>
           </a:p>
           <a:p>
@@ -5050,7 +5069,7 @@
                 <a:latin typeface="Arial" panose="020B0604020202020204" pitchFamily="34" charset="0"/>
                 <a:cs typeface="Arial" panose="020B0604020202020204" pitchFamily="34" charset="0"/>
               </a:rPr>
-              <a:t>0.902</a:t>
+              <a:t>1.622</a:t>
             </a:r>
             <a:endParaRPr lang="en-US" sz="2400" b="1" dirty="0">
               <a:solidFill>
@@ -5058,6 +5077,120 @@
               </a:solidFill>
               <a:latin typeface="Arial" panose="020B0604020202020204" pitchFamily="34" charset="0"/>
               <a:cs typeface="Arial" panose="020B0604020202020204" pitchFamily="34" charset="0"/>
+            </a:endParaRPr>
+          </a:p>
+        </p:txBody>
+      </p:sp>
+      <p:sp>
+        <p:nvSpPr>
+          <p:cNvPr id="2" name="Rectangle 1">
+            <a:extLst>
+              <a:ext uri="{FF2B5EF4-FFF2-40B4-BE49-F238E27FC236}">
+                <a16:creationId xmlns:a16="http://schemas.microsoft.com/office/drawing/2014/main" id="{C8F72A73-EC85-4B6F-A244-44BA327F7B7F}"/>
+              </a:ext>
+            </a:extLst>
+          </p:cNvPr>
+          <p:cNvSpPr>
+            <a:spLocks noChangeArrowheads="1"/>
+          </p:cNvSpPr>
+          <p:nvPr/>
+        </p:nvSpPr>
+        <p:spPr bwMode="auto">
+          <a:xfrm>
+            <a:off x="0" y="74711"/>
+            <a:ext cx="937757" cy="307777"/>
+          </a:xfrm>
+          <a:prstGeom prst="rect">
+            <a:avLst/>
+          </a:prstGeom>
+          <a:solidFill>
+            <a:srgbClr val="FFFFFF"/>
+          </a:solidFill>
+          <a:ln>
+            <a:noFill/>
+          </a:ln>
+          <a:effectLst/>
+          <a:extLst>
+            <a:ext uri="{91240B29-F687-4F45-9708-019B960494DF}">
+              <a14:hiddenLine xmlns:a14="http://schemas.microsoft.com/office/drawing/2010/main" w="9525">
+                <a:solidFill>
+                  <a:schemeClr val="tx1"/>
+                </a:solidFill>
+                <a:miter lim="800000"/>
+                <a:headEnd/>
+                <a:tailEnd/>
+              </a14:hiddenLine>
+            </a:ext>
+            <a:ext uri="{AF507438-7753-43E0-B8FC-AC1667EBCBE1}">
+              <a14:hiddenEffects xmlns:a14="http://schemas.microsoft.com/office/drawing/2010/main">
+                <a:effectLst>
+                  <a:outerShdw dist="35921" dir="2700000" algn="ctr" rotWithShape="0">
+                    <a:schemeClr val="bg2"/>
+                  </a:outerShdw>
+                </a:effectLst>
+              </a14:hiddenEffects>
+            </a:ext>
+          </a:extLst>
+        </p:spPr>
+        <p:txBody>
+          <a:bodyPr vert="horz" wrap="none" lIns="0" tIns="0" rIns="0" bIns="0" numCol="1" anchor="ctr" anchorCtr="0" compatLnSpc="1">
+            <a:prstTxWarp prst="textNoShape">
+              <a:avLst/>
+            </a:prstTxWarp>
+            <a:spAutoFit/>
+          </a:bodyPr>
+          <a:lstStyle/>
+          <a:p>
+            <a:pPr marL="0" marR="0" lvl="0" indent="0" algn="l" defTabSz="914400" rtl="0" eaLnBrk="0" fontAlgn="base" latinLnBrk="0" hangingPunct="0">
+              <a:lnSpc>
+                <a:spcPct val="100000"/>
+              </a:lnSpc>
+              <a:spcBef>
+                <a:spcPct val="0"/>
+              </a:spcBef>
+              <a:spcAft>
+                <a:spcPct val="0"/>
+              </a:spcAft>
+              <a:buClrTx/>
+              <a:buSzTx/>
+              <a:buFontTx/>
+              <a:buNone/>
+              <a:tabLst/>
+            </a:pPr>
+            <a:r>
+              <a:rPr kumimoji="0" lang="en-US" altLang="en-US" sz="2000" b="0" i="0" u="none" strike="noStrike" cap="none" normalizeH="0" baseline="0" dirty="0">
+                <a:ln>
+                  <a:noFill/>
+                </a:ln>
+                <a:solidFill>
+                  <a:srgbClr val="000000"/>
+                </a:solidFill>
+                <a:effectLst/>
+                <a:latin typeface="Courier New" panose="02070309020205020404" pitchFamily="49" charset="0"/>
+              </a:rPr>
+              <a:t>11.793</a:t>
+            </a:r>
+            <a:r>
+              <a:rPr kumimoji="0" lang="en-US" altLang="en-US" sz="500" b="0" i="0" u="none" strike="noStrike" cap="none" normalizeH="0" baseline="0" dirty="0">
+                <a:ln>
+                  <a:noFill/>
+                </a:ln>
+                <a:solidFill>
+                  <a:schemeClr val="tx1"/>
+                </a:solidFill>
+                <a:effectLst/>
+              </a:rPr>
+              <a:t> </a:t>
+            </a:r>
+            <a:endParaRPr kumimoji="0" lang="en-US" altLang="en-US" sz="1800" b="0" i="0" u="none" strike="noStrike" cap="none" normalizeH="0" baseline="0" dirty="0">
+              <a:ln>
+                <a:noFill/>
+              </a:ln>
+              <a:solidFill>
+                <a:schemeClr val="tx1"/>
+              </a:solidFill>
+              <a:effectLst/>
+              <a:latin typeface="Arial" panose="020B0604020202020204" pitchFamily="34" charset="0"/>
             </a:endParaRPr>
           </a:p>
         </p:txBody>
@@ -5151,7 +5284,7 @@
                 <a:latin typeface="Arial" panose="020B0604020202020204" pitchFamily="34" charset="0"/>
                 <a:cs typeface="Arial" panose="020B0604020202020204" pitchFamily="34" charset="0"/>
               </a:rPr>
-              <a:t>Based on the selected features, the Random Forest Regressor model predicted the Weekend Adult ticket Price:  $94.51, which is more than the current ticket price of $81.00.  </a:t>
+              <a:t>Based on the selected features, the Random Forest Regressor model predicted the Weekend Adult ticket Price:  $94.22, which is more than the current ticket price of $81.00.  </a:t>
             </a:r>
           </a:p>
           <a:p>
@@ -5167,7 +5300,7 @@
                 <a:latin typeface="Arial" panose="020B0604020202020204" pitchFamily="34" charset="0"/>
                 <a:cs typeface="Arial" panose="020B0604020202020204" pitchFamily="34" charset="0"/>
               </a:rPr>
-              <a:t>Also there is room for increasing the ticket price by $10.24, as per the model’s Mean Absolute Error value.</a:t>
+              <a:t>Also there is room for increasing the ticket price by $10.39, as per the model’s Mean Absolute Error value.</a:t>
             </a:r>
           </a:p>
         </p:txBody>
@@ -5413,7 +5546,7 @@
         <p:spPr>
           <a:xfrm>
             <a:off x="349321" y="287677"/>
-            <a:ext cx="11712539" cy="7201972"/>
+            <a:ext cx="11712539" cy="7048083"/>
           </a:xfrm>
           <a:prstGeom prst="rect">
             <a:avLst/>
@@ -5466,7 +5599,7 @@
                 <a:latin typeface="Arial" panose="020B0604020202020204" pitchFamily="34" charset="0"/>
                 <a:cs typeface="Arial" panose="020B0604020202020204" pitchFamily="34" charset="0"/>
               </a:rPr>
-              <a:t>This supports the increase in ticket price of  $18.09 and revenue of $31653005, which is expected to cover the operational cost of the resort.</a:t>
+              <a:t>This supports the increase in ticket price of  $8.46 and revenue of $14811594, which is expected to cover the operational cost of the resort.</a:t>
             </a:r>
           </a:p>
           <a:p>
@@ -5497,7 +5630,7 @@
                 <a:latin typeface="Arial" panose="020B0604020202020204" pitchFamily="34" charset="0"/>
                 <a:cs typeface="Arial" panose="020B0604020202020204" pitchFamily="34" charset="0"/>
               </a:rPr>
-              <a:t>Closing of Runs up to 4 neither affects the ticket price nor the revenue of the resort.</a:t>
+              <a:t>Closing of Runs up to 5 runs does not significantly affect the ticket price or the revenue of the resort.</a:t>
             </a:r>
           </a:p>
           <a:p>
@@ -5524,7 +5657,7 @@
                 <a:latin typeface="Arial" panose="020B0604020202020204" pitchFamily="34" charset="0"/>
                 <a:cs typeface="Arial" panose="020B0604020202020204" pitchFamily="34" charset="0"/>
               </a:rPr>
-              <a:t>Increasing the snow making area by 2 acres, will neither significantly increase the ticket price as compared to the one additional chair lift case nor the revenue.</a:t>
+              <a:t>Increasing the snow making area by 2 acres, will neither significantly increase the ticket price($9.75) as compared to the one additional chair lift case nor the revenue ($17068841).</a:t>
             </a:r>
           </a:p>
           <a:p>
@@ -5551,7 +5684,27 @@
                 <a:latin typeface="Arial" panose="020B0604020202020204" pitchFamily="34" charset="0"/>
                 <a:cs typeface="Arial" panose="020B0604020202020204" pitchFamily="34" charset="0"/>
               </a:rPr>
-              <a:t>This will not significantly affect the ticket price or revenue</a:t>
+              <a:t>This does not </a:t>
+            </a:r>
+            <a:r>
+              <a:rPr lang="en-US" sz="2400" b="1" dirty="0" err="1">
+                <a:solidFill>
+                  <a:srgbClr val="B010AC"/>
+                </a:solidFill>
+                <a:latin typeface="Arial" panose="020B0604020202020204" pitchFamily="34" charset="0"/>
+                <a:cs typeface="Arial" panose="020B0604020202020204" pitchFamily="34" charset="0"/>
+              </a:rPr>
+              <a:t>not</a:t>
+            </a:r>
+            <a:r>
+              <a:rPr lang="en-US" sz="2400" b="1" dirty="0">
+                <a:solidFill>
+                  <a:srgbClr val="B010AC"/>
+                </a:solidFill>
+                <a:latin typeface="Arial" panose="020B0604020202020204" pitchFamily="34" charset="0"/>
+                <a:cs typeface="Arial" panose="020B0604020202020204" pitchFamily="34" charset="0"/>
+              </a:rPr>
+              <a:t> at all affect the ticket price or revenue</a:t>
             </a:r>
             <a:r>
               <a:rPr lang="en-US" sz="2400" b="1" dirty="0">
@@ -5710,7 +5863,7 @@
                 <a:latin typeface="Arial" panose="020B0604020202020204" pitchFamily="34" charset="0"/>
                 <a:cs typeface="Arial" panose="020B0604020202020204" pitchFamily="34" charset="0"/>
               </a:rPr>
-              <a:t> more than the average facilities) in the market, the ticket price can be increased to $94.51  from its current price of $81.00.</a:t>
+              <a:t> more than the average facilities) in the market, the ticket price can be increased to $94.22  from its current price of $81.00.</a:t>
             </a:r>
           </a:p>
           <a:p>
@@ -5736,7 +5889,7 @@
                 <a:latin typeface="Arial" panose="020B0604020202020204" pitchFamily="34" charset="0"/>
                 <a:cs typeface="Arial" panose="020B0604020202020204" pitchFamily="34" charset="0"/>
               </a:rPr>
-              <a:t> 4 runs can be closed in the resort without any effect on the resort’s operation.</a:t>
+              <a:t> 5 runs can be closed in the resort without any significant effect on the resort’s operation.</a:t>
             </a:r>
           </a:p>
           <a:p>

</xml_diff>